<commit_message>
modified only pptx file
</commit_message>
<xml_diff>
--- a/class_3/class3.pptx
+++ b/class_3/class3.pptx
@@ -6,10 +6,12 @@
   </p:sldMasterIdLst>
   <p:sldIdLst>
     <p:sldId id="256" r:id="rId2"/>
-    <p:sldId id="257" r:id="rId3"/>
-    <p:sldId id="258" r:id="rId4"/>
-    <p:sldId id="259" r:id="rId5"/>
-    <p:sldId id="260" r:id="rId6"/>
+    <p:sldId id="261" r:id="rId3"/>
+    <p:sldId id="257" r:id="rId4"/>
+    <p:sldId id="258" r:id="rId5"/>
+    <p:sldId id="259" r:id="rId6"/>
+    <p:sldId id="260" r:id="rId7"/>
+    <p:sldId id="262" r:id="rId8"/>
   </p:sldIdLst>
   <p:sldSz cx="9144000" cy="6858000" type="screen4x3"/>
   <p:notesSz cx="6858000" cy="9144000"/>
@@ -292,7 +294,7 @@
           <a:p>
             <a:fld id="{C987C3B9-6055-1346-9A7D-1BB224B7F671}" type="datetimeFigureOut">
               <a:rPr lang="en-US" smtClean="0"/>
-              <a:t>11/2/15</a:t>
+              <a:t>11/4/15</a:t>
             </a:fld>
             <a:endParaRPr lang="en-US"/>
           </a:p>
@@ -462,7 +464,7 @@
           <a:p>
             <a:fld id="{C987C3B9-6055-1346-9A7D-1BB224B7F671}" type="datetimeFigureOut">
               <a:rPr lang="en-US" smtClean="0"/>
-              <a:t>11/2/15</a:t>
+              <a:t>11/4/15</a:t>
             </a:fld>
             <a:endParaRPr lang="en-US"/>
           </a:p>
@@ -642,7 +644,7 @@
           <a:p>
             <a:fld id="{C987C3B9-6055-1346-9A7D-1BB224B7F671}" type="datetimeFigureOut">
               <a:rPr lang="en-US" smtClean="0"/>
-              <a:t>11/2/15</a:t>
+              <a:t>11/4/15</a:t>
             </a:fld>
             <a:endParaRPr lang="en-US"/>
           </a:p>
@@ -812,7 +814,7 @@
           <a:p>
             <a:fld id="{C987C3B9-6055-1346-9A7D-1BB224B7F671}" type="datetimeFigureOut">
               <a:rPr lang="en-US" smtClean="0"/>
-              <a:t>11/2/15</a:t>
+              <a:t>11/4/15</a:t>
             </a:fld>
             <a:endParaRPr lang="en-US"/>
           </a:p>
@@ -1058,7 +1060,7 @@
           <a:p>
             <a:fld id="{C987C3B9-6055-1346-9A7D-1BB224B7F671}" type="datetimeFigureOut">
               <a:rPr lang="en-US" smtClean="0"/>
-              <a:t>11/2/15</a:t>
+              <a:t>11/4/15</a:t>
             </a:fld>
             <a:endParaRPr lang="en-US"/>
           </a:p>
@@ -1346,7 +1348,7 @@
           <a:p>
             <a:fld id="{C987C3B9-6055-1346-9A7D-1BB224B7F671}" type="datetimeFigureOut">
               <a:rPr lang="en-US" smtClean="0"/>
-              <a:t>11/2/15</a:t>
+              <a:t>11/4/15</a:t>
             </a:fld>
             <a:endParaRPr lang="en-US"/>
           </a:p>
@@ -1768,7 +1770,7 @@
           <a:p>
             <a:fld id="{C987C3B9-6055-1346-9A7D-1BB224B7F671}" type="datetimeFigureOut">
               <a:rPr lang="en-US" smtClean="0"/>
-              <a:t>11/2/15</a:t>
+              <a:t>11/4/15</a:t>
             </a:fld>
             <a:endParaRPr lang="en-US"/>
           </a:p>
@@ -1886,7 +1888,7 @@
           <a:p>
             <a:fld id="{C987C3B9-6055-1346-9A7D-1BB224B7F671}" type="datetimeFigureOut">
               <a:rPr lang="en-US" smtClean="0"/>
-              <a:t>11/2/15</a:t>
+              <a:t>11/4/15</a:t>
             </a:fld>
             <a:endParaRPr lang="en-US"/>
           </a:p>
@@ -1981,7 +1983,7 @@
           <a:p>
             <a:fld id="{C987C3B9-6055-1346-9A7D-1BB224B7F671}" type="datetimeFigureOut">
               <a:rPr lang="en-US" smtClean="0"/>
-              <a:t>11/2/15</a:t>
+              <a:t>11/4/15</a:t>
             </a:fld>
             <a:endParaRPr lang="en-US"/>
           </a:p>
@@ -2258,7 +2260,7 @@
           <a:p>
             <a:fld id="{C987C3B9-6055-1346-9A7D-1BB224B7F671}" type="datetimeFigureOut">
               <a:rPr lang="en-US" smtClean="0"/>
-              <a:t>11/2/15</a:t>
+              <a:t>11/4/15</a:t>
             </a:fld>
             <a:endParaRPr lang="en-US"/>
           </a:p>
@@ -2511,7 +2513,7 @@
           <a:p>
             <a:fld id="{C987C3B9-6055-1346-9A7D-1BB224B7F671}" type="datetimeFigureOut">
               <a:rPr lang="en-US" smtClean="0"/>
-              <a:t>11/2/15</a:t>
+              <a:t>11/4/15</a:t>
             </a:fld>
             <a:endParaRPr lang="en-US"/>
           </a:p>
@@ -2724,7 +2726,7 @@
           <a:p>
             <a:fld id="{C987C3B9-6055-1346-9A7D-1BB224B7F671}" type="datetimeFigureOut">
               <a:rPr lang="en-US" smtClean="0"/>
-              <a:t>11/2/15</a:t>
+              <a:t>11/4/15</a:t>
             </a:fld>
             <a:endParaRPr lang="en-US"/>
           </a:p>
@@ -3099,6 +3101,36 @@
           <a:chExt cx="0" cy="0"/>
         </a:xfrm>
       </p:grpSpPr>
+      <p:pic>
+        <p:nvPicPr>
+          <p:cNvPr id="4" name="Picture 3" descr="game-of-thrones-poster.jpg"/>
+          <p:cNvPicPr>
+            <a:picLocks noChangeAspect="1"/>
+          </p:cNvPicPr>
+          <p:nvPr/>
+        </p:nvPicPr>
+        <p:blipFill>
+          <a:blip r:embed="rId2">
+            <a:extLst>
+              <a:ext uri="{28A0092B-C50C-407E-A947-70E740481C1C}">
+                <a14:useLocalDpi xmlns:a14="http://schemas.microsoft.com/office/drawing/2010/main" val="0"/>
+              </a:ext>
+            </a:extLst>
+          </a:blip>
+          <a:stretch>
+            <a:fillRect/>
+          </a:stretch>
+        </p:blipFill>
+        <p:spPr>
+          <a:xfrm>
+            <a:off x="-515993" y="-3713"/>
+            <a:ext cx="10915246" cy="6822029"/>
+          </a:xfrm>
+          <a:prstGeom prst="rect">
+            <a:avLst/>
+          </a:prstGeom>
+        </p:spPr>
+      </p:pic>
       <p:sp>
         <p:nvSpPr>
           <p:cNvPr id="2" name="Title 1"/>
@@ -3109,31 +3141,69 @@
             <p:ph type="ctrTitle"/>
           </p:nvPr>
         </p:nvSpPr>
-        <p:spPr/>
-        <p:txBody>
-          <a:bodyPr/>
-          <a:lstStyle/>
-          <a:p>
-            <a:endParaRPr lang="en-US"/>
-          </a:p>
-        </p:txBody>
-      </p:sp>
-      <p:sp>
-        <p:nvSpPr>
-          <p:cNvPr id="3" name="Subtitle 2"/>
-          <p:cNvSpPr>
-            <a:spLocks noGrp="1"/>
-          </p:cNvSpPr>
-          <p:nvPr>
-            <p:ph type="subTitle" idx="1"/>
-          </p:nvPr>
-        </p:nvSpPr>
-        <p:spPr/>
-        <p:txBody>
-          <a:bodyPr/>
-          <a:lstStyle/>
-          <a:p>
-            <a:endParaRPr lang="en-US"/>
+        <p:spPr>
+          <a:xfrm>
+            <a:off x="685800" y="2527265"/>
+            <a:ext cx="7772400" cy="1470025"/>
+          </a:xfrm>
+        </p:spPr>
+        <p:txBody>
+          <a:bodyPr>
+            <a:normAutofit/>
+          </a:bodyPr>
+          <a:lstStyle/>
+          <a:p>
+            <a:r>
+              <a:rPr lang="en-US" sz="8800" b="1" dirty="0" smtClean="0">
+                <a:ln w="12700">
+                  <a:solidFill>
+                    <a:schemeClr val="tx2">
+                      <a:satMod val="155000"/>
+                    </a:schemeClr>
+                  </a:solidFill>
+                  <a:prstDash val="solid"/>
+                </a:ln>
+                <a:solidFill>
+                  <a:schemeClr val="bg1">
+                    <a:lumMod val="85000"/>
+                  </a:schemeClr>
+                </a:solidFill>
+                <a:effectLst>
+                  <a:outerShdw blurRad="41275" dist="20320" dir="1800000" algn="tl" rotWithShape="0">
+                    <a:srgbClr val="000000">
+                      <a:alpha val="40000"/>
+                    </a:srgbClr>
+                  </a:outerShdw>
+                </a:effectLst>
+                <a:latin typeface="Gloucester MT Extra Condensed"/>
+                <a:cs typeface="Gloucester MT Extra Condensed"/>
+              </a:rPr>
+              <a:t>Grids of Thrones</a:t>
+            </a:r>
+            <a:endParaRPr lang="en-US" sz="8800" b="1" dirty="0">
+              <a:ln w="12700">
+                <a:solidFill>
+                  <a:schemeClr val="tx2">
+                    <a:satMod val="155000"/>
+                  </a:schemeClr>
+                </a:solidFill>
+                <a:prstDash val="solid"/>
+              </a:ln>
+              <a:solidFill>
+                <a:schemeClr val="bg1">
+                  <a:lumMod val="85000"/>
+                </a:schemeClr>
+              </a:solidFill>
+              <a:effectLst>
+                <a:outerShdw blurRad="41275" dist="20320" dir="1800000" algn="tl" rotWithShape="0">
+                  <a:srgbClr val="000000">
+                    <a:alpha val="40000"/>
+                  </a:srgbClr>
+                </a:outerShdw>
+              </a:effectLst>
+              <a:latin typeface="Gloucester MT Extra Condensed"/>
+              <a:cs typeface="Gloucester MT Extra Condensed"/>
+            </a:endParaRPr>
           </a:p>
         </p:txBody>
       </p:sp>
@@ -3147,6 +3217,13 @@
   <p:clrMapOvr>
     <a:masterClrMapping/>
   </p:clrMapOvr>
+  <p:timing>
+    <p:tnLst>
+      <p:par>
+        <p:cTn xmlns:p14="http://schemas.microsoft.com/office/powerpoint/2010/main" id="1" dur="indefinite" restart="never" nodeType="tmRoot"/>
+      </p:par>
+    </p:tnLst>
+  </p:timing>
 </p:sld>
 </file>
 
@@ -3169,25 +3246,6 @@
       </p:grpSpPr>
       <p:sp>
         <p:nvSpPr>
-          <p:cNvPr id="2" name="Title 1"/>
-          <p:cNvSpPr>
-            <a:spLocks noGrp="1"/>
-          </p:cNvSpPr>
-          <p:nvPr>
-            <p:ph type="title"/>
-          </p:nvPr>
-        </p:nvSpPr>
-        <p:spPr/>
-        <p:txBody>
-          <a:bodyPr/>
-          <a:lstStyle/>
-          <a:p>
-            <a:endParaRPr lang="en-US"/>
-          </a:p>
-        </p:txBody>
-      </p:sp>
-      <p:sp>
-        <p:nvSpPr>
           <p:cNvPr id="3" name="Content Placeholder 2"/>
           <p:cNvSpPr>
             <a:spLocks noGrp="1"/>
@@ -3196,126 +3254,71 @@
             <p:ph idx="1"/>
           </p:nvPr>
         </p:nvSpPr>
-        <p:spPr/>
-        <p:txBody>
-          <a:bodyPr>
-            <a:normAutofit lnSpcReduction="10000"/>
-          </a:bodyPr>
-          <a:lstStyle/>
-          <a:p>
+        <p:spPr>
+          <a:xfrm>
+            <a:off x="457200" y="377004"/>
+            <a:ext cx="8229600" cy="5749159"/>
+          </a:xfrm>
+        </p:spPr>
+        <p:txBody>
+          <a:bodyPr/>
+          <a:lstStyle/>
+          <a:p>
+            <a:r>
+              <a:rPr lang="en-US" dirty="0" smtClean="0"/>
+              <a:t>Today:</a:t>
+            </a:r>
+          </a:p>
+          <a:p>
+            <a:pPr lvl="1"/>
             <a:r>
               <a:rPr lang="en-US" dirty="0" err="1" smtClean="0"/>
-              <a:t>Grdraster</a:t>
+              <a:t>grdraster</a:t>
+            </a:r>
+            <a:endParaRPr lang="en-US" dirty="0" smtClean="0"/>
+          </a:p>
+          <a:p>
+            <a:pPr lvl="1"/>
+            <a:r>
+              <a:rPr lang="en-US" dirty="0" err="1" smtClean="0"/>
+              <a:t>grdgradient</a:t>
             </a:r>
             <a:r>
               <a:rPr lang="en-US" dirty="0" smtClean="0"/>
-              <a:t> [</a:t>
-            </a:r>
+              <a:t> </a:t>
+            </a:r>
+          </a:p>
+          <a:p>
+            <a:pPr lvl="1"/>
             <a:r>
               <a:rPr lang="en-US" dirty="0" err="1" smtClean="0"/>
-              <a:t>filenumber</a:t>
+              <a:t>Grdimage</a:t>
+            </a:r>
+            <a:endParaRPr lang="en-US" dirty="0"/>
+          </a:p>
+          <a:p>
+            <a:pPr lvl="1"/>
+            <a:r>
+              <a:rPr lang="en-US" dirty="0" err="1" smtClean="0"/>
+              <a:t>Cpt</a:t>
             </a:r>
             <a:r>
               <a:rPr lang="en-US" dirty="0" smtClean="0"/>
-              <a:t> |  “text </a:t>
-            </a:r>
-            <a:r>
-              <a:rPr lang="en-US" dirty="0" err="1" smtClean="0"/>
-              <a:t>patern</a:t>
-            </a:r>
+              <a:t> files</a:t>
+            </a:r>
+          </a:p>
+          <a:p>
+            <a:pPr lvl="1"/>
+            <a:endParaRPr lang="en-US" dirty="0"/>
+          </a:p>
+          <a:p>
             <a:r>
               <a:rPr lang="en-US" dirty="0" smtClean="0"/>
-              <a:t>”] –</a:t>
-            </a:r>
-            <a:r>
-              <a:rPr lang="en-US" dirty="0" err="1" smtClean="0"/>
-              <a:t>Rwest</a:t>
-            </a:r>
-            <a:r>
-              <a:rPr lang="en-US" dirty="0" smtClean="0"/>
-              <a:t>/east/south/north[r]  … there are more options (we will use the minimum here)</a:t>
-            </a:r>
-          </a:p>
-          <a:p>
-            <a:r>
-              <a:rPr lang="en-US" dirty="0" smtClean="0"/>
-              <a:t>Search for the file in dbase/</a:t>
-            </a:r>
-            <a:r>
-              <a:rPr lang="en-US" dirty="0" err="1" smtClean="0"/>
-              <a:t>grdraster.info</a:t>
-            </a:r>
-            <a:endParaRPr lang="en-US" dirty="0" smtClean="0"/>
-          </a:p>
-          <a:p>
-            <a:pPr marL="0" indent="0">
-              <a:buNone/>
-            </a:pPr>
-            <a:r>
-              <a:rPr lang="en-US" dirty="0" smtClean="0"/>
-              <a:t>In case your GMT does not have these files… we will work with either:</a:t>
-            </a:r>
-          </a:p>
-          <a:p>
-            <a:pPr marL="0" indent="0">
-              <a:buNone/>
-            </a:pPr>
-            <a:r>
-              <a:rPr lang="nl-NL" dirty="0" smtClean="0">
-                <a:hlinkClick r:id="rId2"/>
-              </a:rPr>
-              <a:t>http://www.ngdc.noaa.gov/mgg/global/relief/ETOPO1/data/bedrock/grid_registered/netcdf/</a:t>
-            </a:r>
-            <a:endParaRPr lang="nl-NL" dirty="0" smtClean="0"/>
-          </a:p>
-          <a:p>
-            <a:pPr marL="0" indent="0">
-              <a:buNone/>
-            </a:pPr>
-            <a:r>
-              <a:rPr lang="en-US" dirty="0" smtClean="0"/>
-              <a:t>O</a:t>
-            </a:r>
-            <a:r>
-              <a:rPr lang="nl-NL" dirty="0" smtClean="0"/>
-              <a:t>r the file </a:t>
-            </a:r>
-            <a:r>
-              <a:rPr lang="nl-NL" dirty="0" err="1" smtClean="0"/>
-              <a:t>that</a:t>
-            </a:r>
-            <a:r>
-              <a:rPr lang="nl-NL" dirty="0" smtClean="0"/>
-              <a:t> </a:t>
-            </a:r>
-            <a:r>
-              <a:rPr lang="nl-NL" dirty="0" err="1" smtClean="0"/>
-              <a:t>will</a:t>
-            </a:r>
-            <a:r>
-              <a:rPr lang="nl-NL" dirty="0" smtClean="0"/>
-              <a:t> </a:t>
-            </a:r>
-            <a:r>
-              <a:rPr lang="nl-NL" dirty="0" err="1" smtClean="0"/>
-              <a:t>be</a:t>
-            </a:r>
-            <a:r>
-              <a:rPr lang="nl-NL" dirty="0" smtClean="0"/>
-              <a:t> in the folder</a:t>
-            </a:r>
-            <a:r>
-              <a:rPr lang="en-US" dirty="0" smtClean="0"/>
-              <a:t>…</a:t>
-            </a:r>
-          </a:p>
-          <a:p>
-            <a:pPr marL="0" indent="0">
-              <a:buNone/>
-            </a:pPr>
-            <a:endParaRPr lang="en-US" dirty="0" smtClean="0"/>
-          </a:p>
-          <a:p>
+              <a:t>This is plenty for hours and hours… but we will get just the flavor of it so you can use and reuse these commands </a:t>
+            </a:r>
+          </a:p>
+          <a:p>
+            <a:pPr lvl="1"/>
             <a:endParaRPr lang="en-US" dirty="0"/>
           </a:p>
         </p:txBody>
@@ -3323,13 +3326,20 @@
     </p:spTree>
     <p:extLst>
       <p:ext uri="{BB962C8B-B14F-4D97-AF65-F5344CB8AC3E}">
-        <p14:creationId xmlns:p14="http://schemas.microsoft.com/office/powerpoint/2010/main" val="2588224600"/>
+        <p14:creationId xmlns:p14="http://schemas.microsoft.com/office/powerpoint/2010/main" val="4173893136"/>
       </p:ext>
     </p:extLst>
   </p:cSld>
   <p:clrMapOvr>
     <a:masterClrMapping/>
   </p:clrMapOvr>
+  <p:timing>
+    <p:tnLst>
+      <p:par>
+        <p:cTn xmlns:p14="http://schemas.microsoft.com/office/powerpoint/2010/main" id="1" dur="indefinite" restart="never" nodeType="tmRoot"/>
+      </p:par>
+    </p:tnLst>
+  </p:timing>
 </p:sld>
 </file>
 
@@ -3352,6 +3362,25 @@
       </p:grpSpPr>
       <p:sp>
         <p:nvSpPr>
+          <p:cNvPr id="2" name="Title 1"/>
+          <p:cNvSpPr>
+            <a:spLocks noGrp="1"/>
+          </p:cNvSpPr>
+          <p:nvPr>
+            <p:ph type="title"/>
+          </p:nvPr>
+        </p:nvSpPr>
+        <p:spPr/>
+        <p:txBody>
+          <a:bodyPr/>
+          <a:lstStyle/>
+          <a:p>
+            <a:endParaRPr lang="en-US"/>
+          </a:p>
+        </p:txBody>
+      </p:sp>
+      <p:sp>
+        <p:nvSpPr>
           <p:cNvPr id="3" name="Content Placeholder 2"/>
           <p:cNvSpPr>
             <a:spLocks noGrp="1"/>
@@ -3360,120 +3389,147 @@
             <p:ph idx="1"/>
           </p:nvPr>
         </p:nvSpPr>
-        <p:spPr>
-          <a:xfrm>
-            <a:off x="457200" y="233464"/>
-            <a:ext cx="8229600" cy="5892699"/>
-          </a:xfrm>
-        </p:spPr>
+        <p:spPr/>
         <p:txBody>
           <a:bodyPr>
-            <a:normAutofit/>
+            <a:normAutofit lnSpcReduction="10000"/>
           </a:bodyPr>
           <a:lstStyle/>
           <a:p>
             <a:r>
+              <a:rPr lang="en-US" dirty="0" err="1" smtClean="0"/>
+              <a:t>Grdraster</a:t>
+            </a:r>
+            <a:r>
               <a:rPr lang="en-US" dirty="0" smtClean="0"/>
-              <a:t>We can make grids without having to make big scripts, but if it is a figure that needs to be repeated several times you can just leave the gridding inside your script.</a:t>
-            </a:r>
-          </a:p>
-          <a:p>
+              <a:t> [</a:t>
+            </a:r>
+            <a:r>
+              <a:rPr lang="en-US" dirty="0" err="1" smtClean="0"/>
+              <a:t>filenumber</a:t>
+            </a:r>
             <a:r>
               <a:rPr lang="en-US" dirty="0" smtClean="0"/>
-              <a:t>The line: </a:t>
-            </a:r>
+              <a:t> |  “text </a:t>
+            </a:r>
+            <a:r>
+              <a:rPr lang="en-US" dirty="0" err="1" smtClean="0"/>
+              <a:t>patern</a:t>
+            </a:r>
+            <a:r>
+              <a:rPr lang="en-US" dirty="0" smtClean="0"/>
+              <a:t>”] –</a:t>
+            </a:r>
+            <a:r>
+              <a:rPr lang="en-US" dirty="0" err="1" smtClean="0"/>
+              <a:t>Rwest</a:t>
+            </a:r>
+            <a:r>
+              <a:rPr lang="en-US" dirty="0" smtClean="0"/>
+              <a:t>/east/south/north[r]  … there are more options (we will use the minimum here)</a:t>
+            </a:r>
+          </a:p>
+          <a:p>
+            <a:r>
+              <a:rPr lang="en-US" dirty="0" smtClean="0"/>
+              <a:t>Search for the file in dbase/</a:t>
+            </a:r>
+            <a:r>
+              <a:rPr lang="en-US" dirty="0" err="1" smtClean="0"/>
+              <a:t>grdraster.info</a:t>
+            </a:r>
+            <a:endParaRPr lang="en-US" dirty="0" smtClean="0"/>
           </a:p>
           <a:p>
             <a:pPr marL="0" indent="0">
               <a:buNone/>
             </a:pPr>
             <a:r>
-              <a:rPr lang="en-US" dirty="0"/>
-              <a:t>	</a:t>
-            </a:r>
-            <a:r>
-              <a:rPr lang="en-US" sz="2800" b="1" dirty="0" smtClean="0"/>
-              <a:t>‘</a:t>
-            </a:r>
-            <a:r>
-              <a:rPr lang="fr-FR" sz="2800" b="1" dirty="0" err="1" smtClean="0"/>
-              <a:t>grdraster</a:t>
-            </a:r>
-            <a:r>
-              <a:rPr lang="fr-FR" sz="2800" b="1" dirty="0" smtClean="0"/>
-              <a:t> 9 -R-16/-4/33/45 -</a:t>
-            </a:r>
-            <a:r>
-              <a:rPr lang="fr-FR" sz="2800" b="1" dirty="0" err="1" smtClean="0"/>
-              <a:t>Gmainland.nc</a:t>
-            </a:r>
-            <a:r>
-              <a:rPr lang="fr-FR" sz="2800" b="1" dirty="0" smtClean="0"/>
-              <a:t> -V</a:t>
-            </a:r>
-            <a:r>
-              <a:rPr lang="en-US" sz="2800" b="1" dirty="0" smtClean="0"/>
-              <a:t>’ </a:t>
-            </a:r>
-          </a:p>
-          <a:p>
-            <a:pPr lvl="1"/>
-            <a:r>
               <a:rPr lang="en-US" dirty="0" smtClean="0"/>
-              <a:t>extracts a region from a binary raster file (sp</a:t>
-            </a:r>
+              <a:t>In case your GMT does not have these files… we will work with either:</a:t>
+            </a:r>
+          </a:p>
+          <a:p>
+            <a:pPr marL="0" indent="0">
+              <a:buNone/>
+            </a:pPr>
+            <a:r>
+              <a:rPr lang="nl-NL" dirty="0" smtClean="0">
+                <a:hlinkClick r:id="rId2"/>
+              </a:rPr>
+              <a:t>http://www.ngdc.noaa.gov/mgg/global/relief/ETOPO1/data/bedrock/grid_registered/netcdf/</a:t>
+            </a:r>
+            <a:endParaRPr lang="nl-NL" dirty="0" smtClean="0"/>
+          </a:p>
+          <a:p>
+            <a:pPr marL="0" indent="0">
+              <a:buNone/>
+            </a:pPr>
             <a:r>
               <a:rPr lang="en-US" dirty="0" smtClean="0"/>
-              <a:t>ecified </a:t>
-            </a:r>
-            <a:r>
-              <a:rPr lang="en-US" dirty="0" err="1" smtClean="0"/>
-              <a:t>byt</a:t>
+              <a:t>O</a:t>
+            </a:r>
+            <a:r>
+              <a:rPr lang="nl-NL" dirty="0" smtClean="0"/>
+              <a:t>r the file </a:t>
+            </a:r>
+            <a:r>
+              <a:rPr lang="nl-NL" dirty="0" err="1" smtClean="0"/>
+              <a:t>that</a:t>
+            </a:r>
+            <a:r>
+              <a:rPr lang="nl-NL" dirty="0" smtClean="0"/>
+              <a:t> </a:t>
+            </a:r>
+            <a:r>
+              <a:rPr lang="nl-NL" dirty="0" err="1" smtClean="0"/>
+              <a:t>will</a:t>
+            </a:r>
+            <a:r>
+              <a:rPr lang="nl-NL" dirty="0" smtClean="0"/>
+              <a:t> </a:t>
+            </a:r>
+            <a:r>
+              <a:rPr lang="nl-NL" dirty="0" err="1" smtClean="0"/>
+              <a:t>be</a:t>
+            </a:r>
+            <a:r>
+              <a:rPr lang="nl-NL" dirty="0" smtClean="0"/>
+              <a:t> in the folder</a:t>
             </a:r>
             <a:r>
               <a:rPr lang="en-US" dirty="0" smtClean="0"/>
-              <a:t> the -R and writes a grid file</a:t>
-            </a:r>
-            <a:r>
-              <a:rPr lang="en-US" dirty="0" smtClean="0"/>
-              <a:t>)</a:t>
-            </a:r>
+              <a:t>…</a:t>
+            </a:r>
+          </a:p>
+          <a:p>
+            <a:pPr marL="0" indent="0">
+              <a:buNone/>
+            </a:pPr>
+            <a:endParaRPr lang="en-US" dirty="0" smtClean="0"/>
+          </a:p>
+          <a:p>
             <a:endParaRPr lang="en-US" dirty="0"/>
-          </a:p>
-          <a:p>
-            <a:pPr lvl="1"/>
-            <a:r>
-              <a:rPr lang="en-US" dirty="0" smtClean="0"/>
-              <a:t>Writes to a file specified in the –G </a:t>
-            </a:r>
-          </a:p>
-          <a:p>
-            <a:pPr lvl="1"/>
-            <a:r>
-              <a:rPr lang="en-US" dirty="0" smtClean="0"/>
-              <a:t>‘-V’ is verbose (tells me some details)</a:t>
-            </a:r>
-            <a:endParaRPr lang="en-US" dirty="0"/>
-          </a:p>
-          <a:p>
-            <a:pPr lvl="1"/>
-            <a:r>
-              <a:rPr lang="en-US" dirty="0" smtClean="0"/>
-              <a:t>Where does the “a come from”?</a:t>
-            </a:r>
           </a:p>
         </p:txBody>
       </p:sp>
     </p:spTree>
     <p:extLst>
       <p:ext uri="{BB962C8B-B14F-4D97-AF65-F5344CB8AC3E}">
-        <p14:creationId xmlns:p14="http://schemas.microsoft.com/office/powerpoint/2010/main" val="4014381129"/>
+        <p14:creationId xmlns:p14="http://schemas.microsoft.com/office/powerpoint/2010/main" val="2588224600"/>
       </p:ext>
     </p:extLst>
   </p:cSld>
   <p:clrMapOvr>
     <a:masterClrMapping/>
   </p:clrMapOvr>
+  <p:timing>
+    <p:tnLst>
+      <p:par>
+        <p:cTn xmlns:p14="http://schemas.microsoft.com/office/powerpoint/2010/main" id="1" dur="indefinite" restart="never" nodeType="tmRoot"/>
+      </p:par>
+    </p:tnLst>
+  </p:timing>
 </p:sld>
 </file>
 
@@ -3506,637 +3562,104 @@
         </p:nvSpPr>
         <p:spPr>
           <a:xfrm>
-            <a:off x="112052" y="140078"/>
-            <a:ext cx="8936235" cy="6574342"/>
+            <a:off x="457200" y="233464"/>
+            <a:ext cx="8229600" cy="5892699"/>
           </a:xfrm>
         </p:spPr>
         <p:txBody>
           <a:bodyPr>
-            <a:normAutofit fontScale="92500" lnSpcReduction="10000"/>
+            <a:normAutofit/>
           </a:bodyPr>
           <a:lstStyle/>
           <a:p>
             <a:r>
               <a:rPr lang="en-US" dirty="0" smtClean="0"/>
-              <a:t>That ‘1’ matches a number in a file called </a:t>
+              <a:t>We can make grids without having to make big scripts, but if it is a figure that needs to be repeated several times you can just leave the gridding inside your script.</a:t>
+            </a:r>
+          </a:p>
+          <a:p>
+            <a:r>
+              <a:rPr lang="en-US" dirty="0" smtClean="0"/>
+              <a:t>The line: </a:t>
+            </a:r>
+          </a:p>
+          <a:p>
+            <a:pPr marL="0" indent="0">
+              <a:buNone/>
+            </a:pPr>
+            <a:r>
+              <a:rPr lang="en-US" dirty="0"/>
+              <a:t>	</a:t>
+            </a:r>
+            <a:r>
+              <a:rPr lang="en-US" sz="2800" b="1" dirty="0" smtClean="0"/>
+              <a:t>‘</a:t>
+            </a:r>
+            <a:r>
+              <a:rPr lang="fr-FR" sz="2800" b="1" dirty="0" err="1" smtClean="0"/>
+              <a:t>grdraster</a:t>
+            </a:r>
+            <a:r>
+              <a:rPr lang="fr-FR" sz="2800" b="1" dirty="0" smtClean="0"/>
+              <a:t> 9 -R-16/-4/33/45 -</a:t>
+            </a:r>
+            <a:r>
+              <a:rPr lang="fr-FR" sz="2800" b="1" dirty="0" err="1" smtClean="0"/>
+              <a:t>Gmainland.nc</a:t>
+            </a:r>
+            <a:r>
+              <a:rPr lang="fr-FR" sz="2800" b="1" dirty="0" smtClean="0"/>
+              <a:t> -V</a:t>
+            </a:r>
+            <a:r>
+              <a:rPr lang="en-US" sz="2800" b="1" dirty="0" smtClean="0"/>
+              <a:t>’ </a:t>
+            </a:r>
+          </a:p>
+          <a:p>
+            <a:pPr lvl="1"/>
+            <a:r>
+              <a:rPr lang="en-US" dirty="0" smtClean="0"/>
+              <a:t>extracts a region from a binary raster file (specified </a:t>
             </a:r>
             <a:r>
               <a:rPr lang="en-US" dirty="0" err="1" smtClean="0"/>
-              <a:t>grdraster.info</a:t>
-            </a:r>
-            <a:r>
-              <a:rPr lang="en-US" dirty="0"/>
-              <a:t> </a:t>
+              <a:t>byt</a:t>
             </a:r>
             <a:r>
               <a:rPr lang="en-US" dirty="0" smtClean="0"/>
-              <a:t>(there is one in the folder, open it)…</a:t>
-            </a:r>
-          </a:p>
-          <a:p>
-            <a:pPr marL="0" indent="0">
-              <a:buNone/>
-            </a:pPr>
-            <a:endParaRPr lang="en-US" sz="1600" dirty="0" smtClean="0"/>
-          </a:p>
-          <a:p>
-            <a:pPr marL="0" indent="0">
-              <a:buNone/>
-            </a:pPr>
-            <a:r>
-              <a:rPr lang="en-US" sz="1600" dirty="0" err="1" smtClean="0">
-                <a:solidFill>
-                  <a:srgbClr val="FF0000"/>
-                </a:solidFill>
-              </a:rPr>
-              <a:t>file_number</a:t>
-            </a:r>
-            <a:r>
-              <a:rPr lang="en-US" sz="1600" dirty="0" smtClean="0"/>
-              <a:t> </a:t>
-            </a:r>
-            <a:r>
-              <a:rPr lang="en-US" sz="1600" dirty="0"/>
-              <a:t>"title string" </a:t>
-            </a:r>
-            <a:r>
-              <a:rPr lang="en-US" sz="1600" dirty="0">
-                <a:solidFill>
-                  <a:srgbClr val="FF0000"/>
-                </a:solidFill>
-              </a:rPr>
-              <a:t>"z units"</a:t>
-            </a:r>
-            <a:r>
-              <a:rPr lang="en-US" sz="1600" dirty="0"/>
-              <a:t> -R </a:t>
-            </a:r>
-            <a:r>
-              <a:rPr lang="en-US" sz="1600" dirty="0">
-                <a:solidFill>
-                  <a:srgbClr val="FF0000"/>
-                </a:solidFill>
-              </a:rPr>
-              <a:t>-I</a:t>
-            </a:r>
-            <a:r>
-              <a:rPr lang="en-US" sz="1600" dirty="0"/>
-              <a:t> </a:t>
-            </a:r>
-            <a:r>
-              <a:rPr lang="en-US" sz="1600" dirty="0" err="1"/>
-              <a:t>GorP</a:t>
-            </a:r>
-            <a:r>
-              <a:rPr lang="en-US" sz="1600" dirty="0"/>
-              <a:t> </a:t>
-            </a:r>
-            <a:r>
-              <a:rPr lang="en-US" sz="1600" dirty="0">
-                <a:solidFill>
-                  <a:srgbClr val="FF0000"/>
-                </a:solidFill>
-              </a:rPr>
-              <a:t>type</a:t>
-            </a:r>
-            <a:r>
-              <a:rPr lang="en-US" sz="1600" dirty="0"/>
-              <a:t> scale </a:t>
-            </a:r>
-            <a:r>
-              <a:rPr lang="en-US" sz="1600" dirty="0">
-                <a:solidFill>
-                  <a:srgbClr val="FF0000"/>
-                </a:solidFill>
-              </a:rPr>
-              <a:t>offset</a:t>
-            </a:r>
-            <a:r>
-              <a:rPr lang="en-US" sz="1600" dirty="0"/>
-              <a:t> </a:t>
-            </a:r>
-            <a:r>
-              <a:rPr lang="en-US" sz="1600" dirty="0" err="1"/>
-              <a:t>NaNflag</a:t>
-            </a:r>
-            <a:r>
-              <a:rPr lang="en-US" sz="1600" dirty="0"/>
-              <a:t> </a:t>
-            </a:r>
-            <a:r>
-              <a:rPr lang="en-US" sz="1600" dirty="0">
-                <a:solidFill>
-                  <a:srgbClr val="FF0000"/>
-                </a:solidFill>
-              </a:rPr>
-              <a:t>filename</a:t>
-            </a:r>
-            <a:r>
-              <a:rPr lang="en-US" sz="1600" dirty="0"/>
-              <a:t> [L|B] </a:t>
-            </a:r>
-            <a:r>
-              <a:rPr lang="en-US" sz="1600" dirty="0">
-                <a:solidFill>
-                  <a:srgbClr val="FF0000"/>
-                </a:solidFill>
-              </a:rPr>
-              <a:t>[H&lt;bytes&gt;</a:t>
-            </a:r>
-            <a:r>
-              <a:rPr lang="en-US" sz="1600" dirty="0" smtClean="0">
-                <a:solidFill>
-                  <a:srgbClr val="FF0000"/>
-                </a:solidFill>
-              </a:rPr>
-              <a:t>]</a:t>
-            </a:r>
-          </a:p>
-          <a:p>
-            <a:pPr marL="0" indent="0">
-              <a:buNone/>
-            </a:pPr>
-            <a:r>
-              <a:rPr lang="en-US" sz="1600" dirty="0" smtClean="0"/>
-              <a:t>9 </a:t>
-            </a:r>
-          </a:p>
-          <a:p>
-            <a:pPr marL="0" indent="0">
-              <a:buNone/>
-            </a:pPr>
-            <a:r>
-              <a:rPr lang="en-US" sz="1600" dirty="0" smtClean="0"/>
-              <a:t>"</a:t>
-            </a:r>
-            <a:r>
-              <a:rPr lang="en-US" sz="1600" dirty="0"/>
-              <a:t>ETOPO2 global topography"    "m" -R-180/180/-90/90   -I2m        P </a:t>
-            </a:r>
-            <a:r>
-              <a:rPr lang="en-US" sz="1600" dirty="0" err="1"/>
-              <a:t>i</a:t>
-            </a:r>
-            <a:r>
-              <a:rPr lang="en-US" sz="1600" dirty="0"/>
-              <a:t> 1       0   none    ETOPO2.raw.bin </a:t>
-            </a:r>
-            <a:r>
-              <a:rPr lang="en-US" sz="1600" dirty="0" smtClean="0"/>
-              <a:t>B</a:t>
-            </a:r>
-          </a:p>
-          <a:p>
-            <a:pPr marL="0" indent="0">
-              <a:buNone/>
-            </a:pPr>
-            <a:endParaRPr lang="en-US" sz="1600" dirty="0" smtClean="0"/>
-          </a:p>
-          <a:p>
-            <a:pPr marL="0" indent="0">
-              <a:buNone/>
-            </a:pPr>
-            <a:r>
-              <a:rPr lang="en-US" sz="1600" b="1" dirty="0" err="1" smtClean="0"/>
-              <a:t>File_number</a:t>
-            </a:r>
-            <a:r>
-              <a:rPr lang="en-US" sz="1600" dirty="0" smtClean="0"/>
-              <a:t> = 1</a:t>
-            </a:r>
-          </a:p>
-          <a:p>
-            <a:pPr marL="0" indent="0">
-              <a:buNone/>
-            </a:pPr>
-            <a:r>
-              <a:rPr lang="en-US" sz="1600" b="1" dirty="0" smtClean="0"/>
-              <a:t>“title string” </a:t>
-            </a:r>
-            <a:r>
-              <a:rPr lang="en-US" sz="1600" dirty="0" smtClean="0"/>
-              <a:t>= </a:t>
-            </a:r>
-            <a:r>
-              <a:rPr lang="en-US" sz="1600" dirty="0"/>
-              <a:t>"ETOPO2 global </a:t>
-            </a:r>
-            <a:r>
-              <a:rPr lang="en-US" sz="1600" dirty="0" smtClean="0"/>
-              <a:t>topography”</a:t>
-            </a:r>
-          </a:p>
-          <a:p>
-            <a:pPr marL="0" indent="0">
-              <a:buNone/>
-            </a:pPr>
-            <a:r>
-              <a:rPr lang="en-US" sz="1600" b="1" dirty="0" smtClean="0"/>
-              <a:t>“z units” </a:t>
-            </a:r>
-            <a:r>
-              <a:rPr lang="en-US" sz="1600" dirty="0" smtClean="0"/>
-              <a:t>= </a:t>
-            </a:r>
-            <a:r>
-              <a:rPr lang="en-US" sz="1600" dirty="0"/>
-              <a:t>"</a:t>
-            </a:r>
-            <a:r>
-              <a:rPr lang="en-US" sz="1600" dirty="0" smtClean="0"/>
-              <a:t>m”</a:t>
-            </a:r>
-          </a:p>
-          <a:p>
-            <a:pPr marL="0" indent="0">
-              <a:buNone/>
-            </a:pPr>
-            <a:r>
-              <a:rPr lang="en-US" sz="1600" b="1" dirty="0" smtClean="0"/>
-              <a:t>-R </a:t>
-            </a:r>
-            <a:r>
-              <a:rPr lang="en-US" sz="1600" dirty="0" smtClean="0"/>
-              <a:t>= -R</a:t>
-            </a:r>
-            <a:r>
-              <a:rPr lang="en-US" sz="1600" dirty="0"/>
-              <a:t>-180/180/-90/90 </a:t>
-            </a:r>
-            <a:r>
-              <a:rPr lang="en-US" sz="1600" dirty="0" smtClean="0"/>
-              <a:t> some cases can be 0/360/-90/90, or other restrictions</a:t>
-            </a:r>
-          </a:p>
-          <a:p>
-            <a:pPr marL="0" indent="0">
-              <a:buNone/>
-            </a:pPr>
-            <a:r>
-              <a:rPr lang="en-US" sz="1600" b="1" dirty="0"/>
-              <a:t>-I </a:t>
-            </a:r>
-            <a:r>
-              <a:rPr lang="en-US" sz="1600" dirty="0" smtClean="0"/>
-              <a:t>= -I2m -&gt; </a:t>
-            </a:r>
-            <a:r>
-              <a:rPr lang="en-US" sz="1600" dirty="0" err="1" smtClean="0"/>
-              <a:t>x_inc</a:t>
-            </a:r>
-            <a:r>
-              <a:rPr lang="en-US" sz="1600" dirty="0" smtClean="0"/>
-              <a:t>[/</a:t>
-            </a:r>
-            <a:r>
-              <a:rPr lang="en-US" sz="1600" dirty="0" err="1" smtClean="0"/>
-              <a:t>y_inc</a:t>
-            </a:r>
-            <a:r>
-              <a:rPr lang="en-US" sz="1600" dirty="0" smtClean="0"/>
-              <a:t>] </a:t>
-            </a:r>
-            <a:r>
-              <a:rPr lang="en-US" sz="1600" dirty="0"/>
-              <a:t>describes the sampling </a:t>
-            </a:r>
-            <a:r>
-              <a:rPr lang="en-US" sz="1600" dirty="0" smtClean="0"/>
-              <a:t>interval</a:t>
-            </a:r>
-          </a:p>
-          <a:p>
-            <a:pPr marL="0" indent="0">
-              <a:buNone/>
-            </a:pPr>
-            <a:r>
-              <a:rPr lang="en-US" sz="1600" b="1" dirty="0" err="1" smtClean="0"/>
-              <a:t>GorP</a:t>
-            </a:r>
-            <a:r>
-              <a:rPr lang="en-US" sz="1600" b="1" dirty="0" smtClean="0"/>
-              <a:t> </a:t>
-            </a:r>
-            <a:r>
-              <a:rPr lang="en-US" sz="1600" dirty="0" smtClean="0"/>
-              <a:t>= P -&gt; </a:t>
-            </a:r>
-            <a:r>
-              <a:rPr lang="en-US" sz="1600" dirty="0"/>
-              <a:t>is either G or P, indicating Grid or Pixel registration</a:t>
-            </a:r>
-            <a:r>
-              <a:rPr lang="en-US" sz="1600" dirty="0" smtClean="0"/>
-              <a:t>.</a:t>
-            </a:r>
-          </a:p>
-          <a:p>
-            <a:pPr marL="0" indent="0">
-              <a:buNone/>
-            </a:pPr>
-            <a:r>
-              <a:rPr lang="en-US" sz="1600" b="1" dirty="0" smtClean="0"/>
-              <a:t>Type</a:t>
-            </a:r>
-            <a:r>
-              <a:rPr lang="en-US" sz="1600" dirty="0" smtClean="0"/>
-              <a:t> = </a:t>
-            </a:r>
-            <a:r>
-              <a:rPr lang="en-US" sz="1600" dirty="0" err="1" smtClean="0"/>
-              <a:t>i</a:t>
-            </a:r>
-            <a:r>
-              <a:rPr lang="en-US" sz="1600" dirty="0" smtClean="0"/>
-              <a:t>  -&gt;  </a:t>
-            </a:r>
-            <a:r>
-              <a:rPr lang="en-US" sz="1600" dirty="0"/>
-              <a:t>indicating the kind of data stored in the </a:t>
-            </a:r>
-            <a:r>
-              <a:rPr lang="en-US" sz="1600" dirty="0" smtClean="0"/>
-              <a:t>raster, in this case:</a:t>
-            </a:r>
-          </a:p>
-          <a:p>
-            <a:pPr marL="0" indent="0">
-              <a:buNone/>
-            </a:pPr>
-            <a:r>
-              <a:rPr lang="en-US" sz="1600" dirty="0"/>
-              <a:t>	</a:t>
-            </a:r>
-            <a:r>
-              <a:rPr lang="en-US" sz="1600" dirty="0" smtClean="0"/>
-              <a:t>   </a:t>
-            </a:r>
-            <a:r>
-              <a:rPr lang="en-US" sz="1600" dirty="0" err="1" smtClean="0"/>
-              <a:t>i</a:t>
-            </a:r>
-            <a:r>
-              <a:rPr lang="en-US" sz="1600" dirty="0" smtClean="0"/>
-              <a:t>:   </a:t>
-            </a:r>
-            <a:r>
-              <a:rPr lang="en-US" sz="1600" dirty="0"/>
-              <a:t>signed two-byte integer </a:t>
-            </a:r>
-            <a:r>
-              <a:rPr lang="en-US" sz="1600" dirty="0" smtClean="0"/>
-              <a:t>data</a:t>
-            </a:r>
-          </a:p>
-          <a:p>
-            <a:pPr marL="0" indent="0">
-              <a:buNone/>
-            </a:pPr>
-            <a:r>
-              <a:rPr lang="en-US" sz="1600" b="1" dirty="0"/>
-              <a:t>Scale</a:t>
-            </a:r>
-            <a:r>
-              <a:rPr lang="en-US" sz="1600" dirty="0"/>
-              <a:t> = 1 -&gt; number which should be multiplied on the raster value after </a:t>
-            </a:r>
-            <a:r>
-              <a:rPr lang="en-US" sz="1600" dirty="0" smtClean="0"/>
-              <a:t>read</a:t>
-            </a:r>
-          </a:p>
-          <a:p>
-            <a:pPr marL="0" indent="0">
-              <a:buNone/>
-            </a:pPr>
-            <a:r>
-              <a:rPr lang="en-US" sz="1600" b="1" dirty="0"/>
-              <a:t>Offset</a:t>
-            </a:r>
-            <a:r>
-              <a:rPr lang="en-US" sz="1600" dirty="0"/>
-              <a:t> = 0 -&gt;  number which should be added to the [scaled] raster </a:t>
-            </a:r>
-            <a:r>
-              <a:rPr lang="en-US" sz="1600" dirty="0" smtClean="0"/>
-              <a:t>value </a:t>
-            </a:r>
-          </a:p>
-          <a:p>
-            <a:pPr marL="0" indent="0">
-              <a:buNone/>
-            </a:pPr>
-            <a:r>
-              <a:rPr lang="en-US" sz="1600" b="1" dirty="0" err="1"/>
-              <a:t>NaNflag</a:t>
-            </a:r>
-            <a:r>
-              <a:rPr lang="en-US" sz="1600" dirty="0"/>
-              <a:t> </a:t>
-            </a:r>
-            <a:r>
-              <a:rPr lang="en-US" sz="1600" dirty="0" smtClean="0"/>
-              <a:t> = none -</a:t>
-            </a:r>
-            <a:r>
-              <a:rPr lang="en-US" sz="1600" dirty="0"/>
-              <a:t>&gt; number which is written in the raster to represent </a:t>
-            </a:r>
-            <a:r>
-              <a:rPr lang="en-US" sz="1600" dirty="0" err="1"/>
-              <a:t>NaN</a:t>
-            </a:r>
-            <a:r>
-              <a:rPr lang="en-US" sz="1600" dirty="0"/>
-              <a:t>.</a:t>
-            </a:r>
-          </a:p>
-          <a:p>
-            <a:pPr marL="0" indent="0">
-              <a:buNone/>
-            </a:pPr>
-            <a:r>
-              <a:rPr lang="en-US" sz="1600" dirty="0" smtClean="0"/>
-              <a:t>                                  </a:t>
-            </a:r>
-            <a:r>
-              <a:rPr lang="en-US" sz="1600" dirty="0"/>
-              <a:t>If all values in the raster represent data, </a:t>
-            </a:r>
-            <a:r>
-              <a:rPr lang="en-US" sz="1600" dirty="0" err="1"/>
-              <a:t>NaNflag</a:t>
-            </a:r>
-            <a:r>
-              <a:rPr lang="en-US" sz="1600" dirty="0"/>
-              <a:t> is none</a:t>
-            </a:r>
-            <a:r>
-              <a:rPr lang="en-US" sz="1600" dirty="0" smtClean="0"/>
-              <a:t>.</a:t>
-            </a:r>
-          </a:p>
-          <a:p>
-            <a:pPr marL="0" indent="0">
-              <a:buNone/>
-            </a:pPr>
-            <a:r>
-              <a:rPr lang="en-US" sz="1600" b="1" dirty="0" smtClean="0"/>
-              <a:t>Filename </a:t>
-            </a:r>
-            <a:r>
-              <a:rPr lang="en-US" sz="1600" dirty="0" smtClean="0"/>
-              <a:t>= </a:t>
-            </a:r>
-            <a:r>
-              <a:rPr lang="en-US" sz="1600" dirty="0"/>
-              <a:t>ETOPO2.raw.bin  -&gt;  name the raster </a:t>
-            </a:r>
-            <a:r>
-              <a:rPr lang="en-US" sz="1600" dirty="0" smtClean="0"/>
-              <a:t>file</a:t>
-            </a:r>
-          </a:p>
-          <a:p>
-            <a:pPr marL="0" indent="0">
-              <a:buNone/>
-            </a:pPr>
-            <a:r>
-              <a:rPr lang="en-US" sz="1600" b="1" dirty="0">
-                <a:solidFill>
-                  <a:srgbClr val="000000"/>
-                </a:solidFill>
-              </a:rPr>
-              <a:t>[L|B] </a:t>
-            </a:r>
-            <a:r>
-              <a:rPr lang="en-US" sz="1600" dirty="0"/>
-              <a:t>= </a:t>
-            </a:r>
-            <a:r>
-              <a:rPr lang="en-US" sz="1600" dirty="0" smtClean="0"/>
-              <a:t>B -&gt; BYTE</a:t>
-            </a:r>
-            <a:r>
-              <a:rPr lang="en-US" sz="1600" dirty="0"/>
-              <a:t>-</a:t>
-            </a:r>
-            <a:r>
-              <a:rPr lang="en-US" sz="1600" dirty="0" smtClean="0"/>
-              <a:t>ORDER (</a:t>
-            </a:r>
-            <a:r>
-              <a:rPr lang="en-US" sz="1600" dirty="0"/>
-              <a:t>Big-endian</a:t>
-            </a:r>
-            <a:r>
-              <a:rPr lang="en-US" sz="1600" dirty="0" smtClean="0"/>
-              <a:t>)  this is OPTIONAL</a:t>
-            </a:r>
-          </a:p>
-          <a:p>
-            <a:pPr marL="0" indent="0">
-              <a:buNone/>
-            </a:pPr>
-            <a:r>
-              <a:rPr lang="en-US" sz="1600" b="1" dirty="0">
-                <a:solidFill>
-                  <a:srgbClr val="000000"/>
-                </a:solidFill>
-              </a:rPr>
-              <a:t>[H&lt;bytes&gt;</a:t>
-            </a:r>
-            <a:r>
-              <a:rPr lang="en-US" sz="1600" b="1" dirty="0" smtClean="0">
-                <a:solidFill>
-                  <a:srgbClr val="000000"/>
-                </a:solidFill>
-              </a:rPr>
-              <a:t>] </a:t>
-            </a:r>
-            <a:r>
-              <a:rPr lang="en-US" sz="1600" dirty="0" smtClean="0">
-                <a:solidFill>
-                  <a:srgbClr val="000000"/>
-                </a:solidFill>
-              </a:rPr>
-              <a:t>= # of bites. This is used in case your raster file has a header, </a:t>
-            </a:r>
-            <a:r>
-              <a:rPr lang="en-US" sz="1600" dirty="0" err="1" smtClean="0">
-                <a:solidFill>
-                  <a:srgbClr val="000000"/>
-                </a:solidFill>
-              </a:rPr>
-              <a:t>grdraster</a:t>
-            </a:r>
-            <a:r>
-              <a:rPr lang="en-US" sz="1600" dirty="0" smtClean="0">
-                <a:solidFill>
-                  <a:srgbClr val="000000"/>
-                </a:solidFill>
-              </a:rPr>
-              <a:t> will skip the first # of bites of the file.</a:t>
-            </a:r>
-          </a:p>
-          <a:p>
-            <a:pPr marL="0" indent="0" algn="ctr">
-              <a:buNone/>
-            </a:pPr>
-            <a:r>
-              <a:rPr lang="en-US" sz="1600" dirty="0" smtClean="0">
-                <a:solidFill>
-                  <a:srgbClr val="000000"/>
-                </a:solidFill>
-              </a:rPr>
-              <a:t>ALL THIS INFORMATION IS IN THE </a:t>
-            </a:r>
-            <a:r>
-              <a:rPr lang="en-US" sz="1600" dirty="0" err="1" smtClean="0">
-                <a:solidFill>
-                  <a:srgbClr val="000000"/>
-                </a:solidFill>
-              </a:rPr>
-              <a:t>grdraster.info</a:t>
-            </a:r>
-            <a:r>
-              <a:rPr lang="en-US" sz="1600" dirty="0" smtClean="0">
-                <a:solidFill>
-                  <a:srgbClr val="000000"/>
-                </a:solidFill>
-              </a:rPr>
-              <a:t>‘’ anyway</a:t>
-            </a:r>
-            <a:endParaRPr lang="en-US" sz="1600" dirty="0">
-              <a:solidFill>
-                <a:srgbClr val="000000"/>
-              </a:solidFill>
-            </a:endParaRPr>
-          </a:p>
-          <a:p>
-            <a:pPr marL="0" indent="0">
-              <a:buNone/>
-            </a:pPr>
-            <a:endParaRPr lang="en-US" sz="1600" dirty="0" smtClean="0"/>
-          </a:p>
-          <a:p>
-            <a:pPr marL="0" indent="0">
-              <a:buNone/>
-            </a:pPr>
-            <a:endParaRPr lang="en-US" sz="1600" dirty="0"/>
-          </a:p>
-          <a:p>
-            <a:endParaRPr lang="en-US" dirty="0" smtClean="0"/>
-          </a:p>
-          <a:p>
+              <a:t> the -R and writes a grid file)</a:t>
+            </a:r>
             <a:endParaRPr lang="en-US" dirty="0"/>
+          </a:p>
+          <a:p>
+            <a:pPr lvl="1"/>
+            <a:r>
+              <a:rPr lang="en-US" dirty="0" smtClean="0"/>
+              <a:t>Writes to a file specified in the –G </a:t>
+            </a:r>
+          </a:p>
+          <a:p>
+            <a:pPr lvl="1"/>
+            <a:r>
+              <a:rPr lang="en-US" dirty="0" smtClean="0"/>
+              <a:t>‘-V’ is verbose (tells me some details)</a:t>
+            </a:r>
+            <a:endParaRPr lang="en-US" dirty="0"/>
+          </a:p>
+          <a:p>
+            <a:pPr lvl="1"/>
+            <a:r>
+              <a:rPr lang="en-US" dirty="0" smtClean="0"/>
+              <a:t>Where does the “a come from”?</a:t>
+            </a:r>
           </a:p>
         </p:txBody>
       </p:sp>
     </p:spTree>
     <p:extLst>
       <p:ext uri="{BB962C8B-B14F-4D97-AF65-F5344CB8AC3E}">
-        <p14:creationId xmlns:p14="http://schemas.microsoft.com/office/powerpoint/2010/main" val="2231770549"/>
+        <p14:creationId xmlns:p14="http://schemas.microsoft.com/office/powerpoint/2010/main" val="4014381129"/>
       </p:ext>
     </p:extLst>
   </p:cSld>
@@ -4175,6 +3698,675 @@
         </p:nvSpPr>
         <p:spPr>
           <a:xfrm>
+            <a:off x="112052" y="140078"/>
+            <a:ext cx="8936235" cy="6574342"/>
+          </a:xfrm>
+        </p:spPr>
+        <p:txBody>
+          <a:bodyPr>
+            <a:normAutofit fontScale="92500" lnSpcReduction="10000"/>
+          </a:bodyPr>
+          <a:lstStyle/>
+          <a:p>
+            <a:r>
+              <a:rPr lang="en-US" dirty="0" smtClean="0"/>
+              <a:t>That ‘1’ matches a number in a file called </a:t>
+            </a:r>
+            <a:r>
+              <a:rPr lang="en-US" dirty="0" err="1" smtClean="0"/>
+              <a:t>grdraster.info</a:t>
+            </a:r>
+            <a:r>
+              <a:rPr lang="en-US" dirty="0"/>
+              <a:t> </a:t>
+            </a:r>
+            <a:r>
+              <a:rPr lang="en-US" dirty="0" smtClean="0"/>
+              <a:t>(there is one in the folder, open it)…</a:t>
+            </a:r>
+          </a:p>
+          <a:p>
+            <a:pPr marL="0" indent="0">
+              <a:buNone/>
+            </a:pPr>
+            <a:endParaRPr lang="en-US" sz="1600" dirty="0" smtClean="0"/>
+          </a:p>
+          <a:p>
+            <a:pPr marL="0" indent="0">
+              <a:buNone/>
+            </a:pPr>
+            <a:r>
+              <a:rPr lang="en-US" sz="1600" dirty="0" err="1" smtClean="0">
+                <a:solidFill>
+                  <a:srgbClr val="FF0000"/>
+                </a:solidFill>
+              </a:rPr>
+              <a:t>file_number</a:t>
+            </a:r>
+            <a:r>
+              <a:rPr lang="en-US" sz="1600" dirty="0" smtClean="0"/>
+              <a:t> </a:t>
+            </a:r>
+            <a:r>
+              <a:rPr lang="en-US" sz="1600" dirty="0"/>
+              <a:t>"title string" </a:t>
+            </a:r>
+            <a:r>
+              <a:rPr lang="en-US" sz="1600" dirty="0">
+                <a:solidFill>
+                  <a:srgbClr val="FF0000"/>
+                </a:solidFill>
+              </a:rPr>
+              <a:t>"z units"</a:t>
+            </a:r>
+            <a:r>
+              <a:rPr lang="en-US" sz="1600" dirty="0"/>
+              <a:t> -R </a:t>
+            </a:r>
+            <a:r>
+              <a:rPr lang="en-US" sz="1600" dirty="0">
+                <a:solidFill>
+                  <a:srgbClr val="FF0000"/>
+                </a:solidFill>
+              </a:rPr>
+              <a:t>-I</a:t>
+            </a:r>
+            <a:r>
+              <a:rPr lang="en-US" sz="1600" dirty="0"/>
+              <a:t> </a:t>
+            </a:r>
+            <a:r>
+              <a:rPr lang="en-US" sz="1600" dirty="0" err="1"/>
+              <a:t>GorP</a:t>
+            </a:r>
+            <a:r>
+              <a:rPr lang="en-US" sz="1600" dirty="0"/>
+              <a:t> </a:t>
+            </a:r>
+            <a:r>
+              <a:rPr lang="en-US" sz="1600" dirty="0">
+                <a:solidFill>
+                  <a:srgbClr val="FF0000"/>
+                </a:solidFill>
+              </a:rPr>
+              <a:t>type</a:t>
+            </a:r>
+            <a:r>
+              <a:rPr lang="en-US" sz="1600" dirty="0"/>
+              <a:t> scale </a:t>
+            </a:r>
+            <a:r>
+              <a:rPr lang="en-US" sz="1600" dirty="0">
+                <a:solidFill>
+                  <a:srgbClr val="FF0000"/>
+                </a:solidFill>
+              </a:rPr>
+              <a:t>offset</a:t>
+            </a:r>
+            <a:r>
+              <a:rPr lang="en-US" sz="1600" dirty="0"/>
+              <a:t> </a:t>
+            </a:r>
+            <a:r>
+              <a:rPr lang="en-US" sz="1600" dirty="0" err="1"/>
+              <a:t>NaNflag</a:t>
+            </a:r>
+            <a:r>
+              <a:rPr lang="en-US" sz="1600" dirty="0"/>
+              <a:t> </a:t>
+            </a:r>
+            <a:r>
+              <a:rPr lang="en-US" sz="1600" dirty="0">
+                <a:solidFill>
+                  <a:srgbClr val="FF0000"/>
+                </a:solidFill>
+              </a:rPr>
+              <a:t>filename</a:t>
+            </a:r>
+            <a:r>
+              <a:rPr lang="en-US" sz="1600" dirty="0"/>
+              <a:t> [L|B] </a:t>
+            </a:r>
+            <a:r>
+              <a:rPr lang="en-US" sz="1600" dirty="0">
+                <a:solidFill>
+                  <a:srgbClr val="FF0000"/>
+                </a:solidFill>
+              </a:rPr>
+              <a:t>[H&lt;bytes&gt;</a:t>
+            </a:r>
+            <a:r>
+              <a:rPr lang="en-US" sz="1600" dirty="0" smtClean="0">
+                <a:solidFill>
+                  <a:srgbClr val="FF0000"/>
+                </a:solidFill>
+              </a:rPr>
+              <a:t>]</a:t>
+            </a:r>
+          </a:p>
+          <a:p>
+            <a:pPr marL="0" indent="0">
+              <a:buNone/>
+            </a:pPr>
+            <a:r>
+              <a:rPr lang="en-US" sz="1600" dirty="0" smtClean="0"/>
+              <a:t>9 </a:t>
+            </a:r>
+          </a:p>
+          <a:p>
+            <a:pPr marL="0" indent="0">
+              <a:buNone/>
+            </a:pPr>
+            <a:r>
+              <a:rPr lang="en-US" sz="1600" dirty="0" smtClean="0"/>
+              <a:t>"</a:t>
+            </a:r>
+            <a:r>
+              <a:rPr lang="en-US" sz="1600" dirty="0"/>
+              <a:t>ETOPO2 global topography"    "m" -R-180/180/-90/90   -I2m        P </a:t>
+            </a:r>
+            <a:r>
+              <a:rPr lang="en-US" sz="1600" dirty="0" err="1"/>
+              <a:t>i</a:t>
+            </a:r>
+            <a:r>
+              <a:rPr lang="en-US" sz="1600" dirty="0"/>
+              <a:t> 1       0   none    ETOPO2.raw.bin </a:t>
+            </a:r>
+            <a:r>
+              <a:rPr lang="en-US" sz="1600" dirty="0" smtClean="0"/>
+              <a:t>B</a:t>
+            </a:r>
+          </a:p>
+          <a:p>
+            <a:pPr marL="0" indent="0">
+              <a:buNone/>
+            </a:pPr>
+            <a:endParaRPr lang="en-US" sz="1600" dirty="0" smtClean="0"/>
+          </a:p>
+          <a:p>
+            <a:pPr marL="0" indent="0">
+              <a:buNone/>
+            </a:pPr>
+            <a:r>
+              <a:rPr lang="en-US" sz="1600" b="1" dirty="0" err="1" smtClean="0"/>
+              <a:t>File_number</a:t>
+            </a:r>
+            <a:r>
+              <a:rPr lang="en-US" sz="1600" dirty="0" smtClean="0"/>
+              <a:t> = 1</a:t>
+            </a:r>
+          </a:p>
+          <a:p>
+            <a:pPr marL="0" indent="0">
+              <a:buNone/>
+            </a:pPr>
+            <a:r>
+              <a:rPr lang="en-US" sz="1600" b="1" dirty="0" smtClean="0"/>
+              <a:t>“title string” </a:t>
+            </a:r>
+            <a:r>
+              <a:rPr lang="en-US" sz="1600" dirty="0" smtClean="0"/>
+              <a:t>= </a:t>
+            </a:r>
+            <a:r>
+              <a:rPr lang="en-US" sz="1600" dirty="0"/>
+              <a:t>"ETOPO2 global </a:t>
+            </a:r>
+            <a:r>
+              <a:rPr lang="en-US" sz="1600" dirty="0" smtClean="0"/>
+              <a:t>topography”</a:t>
+            </a:r>
+          </a:p>
+          <a:p>
+            <a:pPr marL="0" indent="0">
+              <a:buNone/>
+            </a:pPr>
+            <a:r>
+              <a:rPr lang="en-US" sz="1600" b="1" dirty="0" smtClean="0"/>
+              <a:t>“z units” </a:t>
+            </a:r>
+            <a:r>
+              <a:rPr lang="en-US" sz="1600" dirty="0" smtClean="0"/>
+              <a:t>= </a:t>
+            </a:r>
+            <a:r>
+              <a:rPr lang="en-US" sz="1600" dirty="0"/>
+              <a:t>"</a:t>
+            </a:r>
+            <a:r>
+              <a:rPr lang="en-US" sz="1600" dirty="0" smtClean="0"/>
+              <a:t>m”</a:t>
+            </a:r>
+          </a:p>
+          <a:p>
+            <a:pPr marL="0" indent="0">
+              <a:buNone/>
+            </a:pPr>
+            <a:r>
+              <a:rPr lang="en-US" sz="1600" b="1" dirty="0" smtClean="0"/>
+              <a:t>-R </a:t>
+            </a:r>
+            <a:r>
+              <a:rPr lang="en-US" sz="1600" dirty="0" smtClean="0"/>
+              <a:t>= -R</a:t>
+            </a:r>
+            <a:r>
+              <a:rPr lang="en-US" sz="1600" dirty="0"/>
+              <a:t>-180/180/-90/90 </a:t>
+            </a:r>
+            <a:r>
+              <a:rPr lang="en-US" sz="1600" dirty="0" smtClean="0"/>
+              <a:t> some cases can be 0/360/-90/90, or other restrictions</a:t>
+            </a:r>
+          </a:p>
+          <a:p>
+            <a:pPr marL="0" indent="0">
+              <a:buNone/>
+            </a:pPr>
+            <a:r>
+              <a:rPr lang="en-US" sz="1600" b="1" dirty="0"/>
+              <a:t>-I </a:t>
+            </a:r>
+            <a:r>
+              <a:rPr lang="en-US" sz="1600" dirty="0" smtClean="0"/>
+              <a:t>= -I2m -&gt; </a:t>
+            </a:r>
+            <a:r>
+              <a:rPr lang="en-US" sz="1600" dirty="0" err="1" smtClean="0"/>
+              <a:t>x_inc</a:t>
+            </a:r>
+            <a:r>
+              <a:rPr lang="en-US" sz="1600" dirty="0" smtClean="0"/>
+              <a:t>[/</a:t>
+            </a:r>
+            <a:r>
+              <a:rPr lang="en-US" sz="1600" dirty="0" err="1" smtClean="0"/>
+              <a:t>y_inc</a:t>
+            </a:r>
+            <a:r>
+              <a:rPr lang="en-US" sz="1600" dirty="0" smtClean="0"/>
+              <a:t>] </a:t>
+            </a:r>
+            <a:r>
+              <a:rPr lang="en-US" sz="1600" dirty="0"/>
+              <a:t>describes the sampling </a:t>
+            </a:r>
+            <a:r>
+              <a:rPr lang="en-US" sz="1600" dirty="0" smtClean="0"/>
+              <a:t>interval</a:t>
+            </a:r>
+          </a:p>
+          <a:p>
+            <a:pPr marL="0" indent="0">
+              <a:buNone/>
+            </a:pPr>
+            <a:r>
+              <a:rPr lang="en-US" sz="1600" b="1" dirty="0" err="1" smtClean="0"/>
+              <a:t>GorP</a:t>
+            </a:r>
+            <a:r>
+              <a:rPr lang="en-US" sz="1600" b="1" dirty="0" smtClean="0"/>
+              <a:t> </a:t>
+            </a:r>
+            <a:r>
+              <a:rPr lang="en-US" sz="1600" dirty="0" smtClean="0"/>
+              <a:t>= P -&gt; </a:t>
+            </a:r>
+            <a:r>
+              <a:rPr lang="en-US" sz="1600" dirty="0"/>
+              <a:t>is either G or P, indicating Grid or Pixel registration</a:t>
+            </a:r>
+            <a:r>
+              <a:rPr lang="en-US" sz="1600" dirty="0" smtClean="0"/>
+              <a:t>.</a:t>
+            </a:r>
+          </a:p>
+          <a:p>
+            <a:pPr marL="0" indent="0">
+              <a:buNone/>
+            </a:pPr>
+            <a:r>
+              <a:rPr lang="en-US" sz="1600" b="1" dirty="0" smtClean="0"/>
+              <a:t>Type</a:t>
+            </a:r>
+            <a:r>
+              <a:rPr lang="en-US" sz="1600" dirty="0" smtClean="0"/>
+              <a:t> = </a:t>
+            </a:r>
+            <a:r>
+              <a:rPr lang="en-US" sz="1600" dirty="0" err="1" smtClean="0"/>
+              <a:t>i</a:t>
+            </a:r>
+            <a:r>
+              <a:rPr lang="en-US" sz="1600" dirty="0" smtClean="0"/>
+              <a:t>  -&gt;  </a:t>
+            </a:r>
+            <a:r>
+              <a:rPr lang="en-US" sz="1600" dirty="0"/>
+              <a:t>indicating the kind of data stored in the </a:t>
+            </a:r>
+            <a:r>
+              <a:rPr lang="en-US" sz="1600" dirty="0" smtClean="0"/>
+              <a:t>raster, in this case:</a:t>
+            </a:r>
+          </a:p>
+          <a:p>
+            <a:pPr marL="0" indent="0">
+              <a:buNone/>
+            </a:pPr>
+            <a:r>
+              <a:rPr lang="en-US" sz="1600" dirty="0"/>
+              <a:t>	</a:t>
+            </a:r>
+            <a:r>
+              <a:rPr lang="en-US" sz="1600" dirty="0" smtClean="0"/>
+              <a:t>   </a:t>
+            </a:r>
+            <a:r>
+              <a:rPr lang="en-US" sz="1600" dirty="0" err="1" smtClean="0"/>
+              <a:t>i</a:t>
+            </a:r>
+            <a:r>
+              <a:rPr lang="en-US" sz="1600" dirty="0" smtClean="0"/>
+              <a:t>:   </a:t>
+            </a:r>
+            <a:r>
+              <a:rPr lang="en-US" sz="1600" dirty="0"/>
+              <a:t>signed two-byte integer </a:t>
+            </a:r>
+            <a:r>
+              <a:rPr lang="en-US" sz="1600" dirty="0" smtClean="0"/>
+              <a:t>data</a:t>
+            </a:r>
+          </a:p>
+          <a:p>
+            <a:pPr marL="0" indent="0">
+              <a:buNone/>
+            </a:pPr>
+            <a:r>
+              <a:rPr lang="en-US" sz="1600" b="1" dirty="0"/>
+              <a:t>Scale</a:t>
+            </a:r>
+            <a:r>
+              <a:rPr lang="en-US" sz="1600" dirty="0"/>
+              <a:t> = 1 -&gt; number which should be multiplied on the raster value after </a:t>
+            </a:r>
+            <a:r>
+              <a:rPr lang="en-US" sz="1600" dirty="0" smtClean="0"/>
+              <a:t>read</a:t>
+            </a:r>
+          </a:p>
+          <a:p>
+            <a:pPr marL="0" indent="0">
+              <a:buNone/>
+            </a:pPr>
+            <a:r>
+              <a:rPr lang="en-US" sz="1600" b="1" dirty="0"/>
+              <a:t>Offset</a:t>
+            </a:r>
+            <a:r>
+              <a:rPr lang="en-US" sz="1600" dirty="0"/>
+              <a:t> = 0 -&gt;  number which should be added to the [scaled] raster </a:t>
+            </a:r>
+            <a:r>
+              <a:rPr lang="en-US" sz="1600" dirty="0" smtClean="0"/>
+              <a:t>value </a:t>
+            </a:r>
+          </a:p>
+          <a:p>
+            <a:pPr marL="0" indent="0">
+              <a:buNone/>
+            </a:pPr>
+            <a:r>
+              <a:rPr lang="en-US" sz="1600" b="1" dirty="0" err="1"/>
+              <a:t>NaNflag</a:t>
+            </a:r>
+            <a:r>
+              <a:rPr lang="en-US" sz="1600" dirty="0"/>
+              <a:t> </a:t>
+            </a:r>
+            <a:r>
+              <a:rPr lang="en-US" sz="1600" dirty="0" smtClean="0"/>
+              <a:t> = none -</a:t>
+            </a:r>
+            <a:r>
+              <a:rPr lang="en-US" sz="1600" dirty="0"/>
+              <a:t>&gt; number which is written in the raster to represent </a:t>
+            </a:r>
+            <a:r>
+              <a:rPr lang="en-US" sz="1600" dirty="0" err="1"/>
+              <a:t>NaN</a:t>
+            </a:r>
+            <a:r>
+              <a:rPr lang="en-US" sz="1600" dirty="0"/>
+              <a:t>.</a:t>
+            </a:r>
+          </a:p>
+          <a:p>
+            <a:pPr marL="0" indent="0">
+              <a:buNone/>
+            </a:pPr>
+            <a:r>
+              <a:rPr lang="en-US" sz="1600" dirty="0" smtClean="0"/>
+              <a:t>                                  </a:t>
+            </a:r>
+            <a:r>
+              <a:rPr lang="en-US" sz="1600" dirty="0"/>
+              <a:t>If all values in the raster represent data, </a:t>
+            </a:r>
+            <a:r>
+              <a:rPr lang="en-US" sz="1600" dirty="0" err="1"/>
+              <a:t>NaNflag</a:t>
+            </a:r>
+            <a:r>
+              <a:rPr lang="en-US" sz="1600" dirty="0"/>
+              <a:t> is none</a:t>
+            </a:r>
+            <a:r>
+              <a:rPr lang="en-US" sz="1600" dirty="0" smtClean="0"/>
+              <a:t>.</a:t>
+            </a:r>
+          </a:p>
+          <a:p>
+            <a:pPr marL="0" indent="0">
+              <a:buNone/>
+            </a:pPr>
+            <a:r>
+              <a:rPr lang="en-US" sz="1600" b="1" dirty="0" smtClean="0"/>
+              <a:t>Filename </a:t>
+            </a:r>
+            <a:r>
+              <a:rPr lang="en-US" sz="1600" dirty="0" smtClean="0"/>
+              <a:t>= </a:t>
+            </a:r>
+            <a:r>
+              <a:rPr lang="en-US" sz="1600" dirty="0"/>
+              <a:t>ETOPO2.raw.bin  -&gt;  name the raster </a:t>
+            </a:r>
+            <a:r>
+              <a:rPr lang="en-US" sz="1600" dirty="0" smtClean="0"/>
+              <a:t>file</a:t>
+            </a:r>
+          </a:p>
+          <a:p>
+            <a:pPr marL="0" indent="0">
+              <a:buNone/>
+            </a:pPr>
+            <a:r>
+              <a:rPr lang="en-US" sz="1600" b="1" dirty="0">
+                <a:solidFill>
+                  <a:srgbClr val="000000"/>
+                </a:solidFill>
+              </a:rPr>
+              <a:t>[L|B] </a:t>
+            </a:r>
+            <a:r>
+              <a:rPr lang="en-US" sz="1600" dirty="0"/>
+              <a:t>= </a:t>
+            </a:r>
+            <a:r>
+              <a:rPr lang="en-US" sz="1600" dirty="0" smtClean="0"/>
+              <a:t>B -&gt; BYTE</a:t>
+            </a:r>
+            <a:r>
+              <a:rPr lang="en-US" sz="1600" dirty="0"/>
+              <a:t>-</a:t>
+            </a:r>
+            <a:r>
+              <a:rPr lang="en-US" sz="1600" dirty="0" smtClean="0"/>
+              <a:t>ORDER (</a:t>
+            </a:r>
+            <a:r>
+              <a:rPr lang="en-US" sz="1600" dirty="0"/>
+              <a:t>Big-endian</a:t>
+            </a:r>
+            <a:r>
+              <a:rPr lang="en-US" sz="1600" dirty="0" smtClean="0"/>
+              <a:t>)  this is OPTIONAL</a:t>
+            </a:r>
+          </a:p>
+          <a:p>
+            <a:pPr marL="0" indent="0">
+              <a:buNone/>
+            </a:pPr>
+            <a:r>
+              <a:rPr lang="en-US" sz="1600" b="1" dirty="0">
+                <a:solidFill>
+                  <a:srgbClr val="000000"/>
+                </a:solidFill>
+              </a:rPr>
+              <a:t>[H&lt;bytes&gt;</a:t>
+            </a:r>
+            <a:r>
+              <a:rPr lang="en-US" sz="1600" b="1" dirty="0" smtClean="0">
+                <a:solidFill>
+                  <a:srgbClr val="000000"/>
+                </a:solidFill>
+              </a:rPr>
+              <a:t>] </a:t>
+            </a:r>
+            <a:r>
+              <a:rPr lang="en-US" sz="1600" dirty="0" smtClean="0">
+                <a:solidFill>
+                  <a:srgbClr val="000000"/>
+                </a:solidFill>
+              </a:rPr>
+              <a:t>= # of bites. This is used in case your raster file has a header, </a:t>
+            </a:r>
+            <a:r>
+              <a:rPr lang="en-US" sz="1600" dirty="0" err="1" smtClean="0">
+                <a:solidFill>
+                  <a:srgbClr val="000000"/>
+                </a:solidFill>
+              </a:rPr>
+              <a:t>grdraster</a:t>
+            </a:r>
+            <a:r>
+              <a:rPr lang="en-US" sz="1600" dirty="0" smtClean="0">
+                <a:solidFill>
+                  <a:srgbClr val="000000"/>
+                </a:solidFill>
+              </a:rPr>
+              <a:t> will skip the first # of bites of the file.</a:t>
+            </a:r>
+          </a:p>
+          <a:p>
+            <a:pPr marL="0" indent="0" algn="ctr">
+              <a:buNone/>
+            </a:pPr>
+            <a:r>
+              <a:rPr lang="en-US" sz="1600" dirty="0" smtClean="0">
+                <a:solidFill>
+                  <a:srgbClr val="000000"/>
+                </a:solidFill>
+              </a:rPr>
+              <a:t>ALL THIS INFORMATION IS IN THE </a:t>
+            </a:r>
+            <a:r>
+              <a:rPr lang="en-US" sz="1600" dirty="0" err="1" smtClean="0">
+                <a:solidFill>
+                  <a:srgbClr val="000000"/>
+                </a:solidFill>
+              </a:rPr>
+              <a:t>grdraster.info</a:t>
+            </a:r>
+            <a:r>
+              <a:rPr lang="en-US" sz="1600" dirty="0" smtClean="0">
+                <a:solidFill>
+                  <a:srgbClr val="000000"/>
+                </a:solidFill>
+              </a:rPr>
+              <a:t>‘’ anyway</a:t>
+            </a:r>
+            <a:endParaRPr lang="en-US" sz="1600" dirty="0">
+              <a:solidFill>
+                <a:srgbClr val="000000"/>
+              </a:solidFill>
+            </a:endParaRPr>
+          </a:p>
+          <a:p>
+            <a:pPr marL="0" indent="0">
+              <a:buNone/>
+            </a:pPr>
+            <a:endParaRPr lang="en-US" sz="1600" dirty="0" smtClean="0"/>
+          </a:p>
+          <a:p>
+            <a:pPr marL="0" indent="0">
+              <a:buNone/>
+            </a:pPr>
+            <a:endParaRPr lang="en-US" sz="1600" dirty="0"/>
+          </a:p>
+          <a:p>
+            <a:endParaRPr lang="en-US" dirty="0" smtClean="0"/>
+          </a:p>
+          <a:p>
+            <a:endParaRPr lang="en-US" dirty="0"/>
+          </a:p>
+        </p:txBody>
+      </p:sp>
+    </p:spTree>
+    <p:extLst>
+      <p:ext uri="{BB962C8B-B14F-4D97-AF65-F5344CB8AC3E}">
+        <p14:creationId xmlns:p14="http://schemas.microsoft.com/office/powerpoint/2010/main" val="2231770549"/>
+      </p:ext>
+    </p:extLst>
+  </p:cSld>
+  <p:clrMapOvr>
+    <a:masterClrMapping/>
+  </p:clrMapOvr>
+</p:sld>
+</file>
+
+<file path=ppt/slides/slide6.xml><?xml version="1.0" encoding="utf-8"?>
+<p:sld xmlns:a="http://schemas.openxmlformats.org/drawingml/2006/main" xmlns:r="http://schemas.openxmlformats.org/officeDocument/2006/relationships" xmlns:p="http://schemas.openxmlformats.org/presentationml/2006/main">
+  <p:cSld>
+    <p:spTree>
+      <p:nvGrpSpPr>
+        <p:cNvPr id="1" name=""/>
+        <p:cNvGrpSpPr/>
+        <p:nvPr/>
+      </p:nvGrpSpPr>
+      <p:grpSpPr>
+        <a:xfrm>
+          <a:off x="0" y="0"/>
+          <a:ext cx="0" cy="0"/>
+          <a:chOff x="0" y="0"/>
+          <a:chExt cx="0" cy="0"/>
+        </a:xfrm>
+      </p:grpSpPr>
+      <p:sp>
+        <p:nvSpPr>
+          <p:cNvPr id="3" name="Content Placeholder 2"/>
+          <p:cNvSpPr>
+            <a:spLocks noGrp="1"/>
+          </p:cNvSpPr>
+          <p:nvPr>
+            <p:ph idx="1"/>
+          </p:nvPr>
+        </p:nvSpPr>
+        <p:spPr>
+          <a:xfrm>
             <a:off x="177417" y="168094"/>
             <a:ext cx="8768156" cy="6368893"/>
           </a:xfrm>
@@ -4236,7 +4428,7 @@
               <a:t>mainland.nc</a:t>
             </a:r>
             <a:r>
-              <a:rPr lang="en-US" smtClean="0"/>
+              <a:rPr lang="en-US" dirty="0" smtClean="0"/>
               <a:t> </a:t>
             </a:r>
           </a:p>
@@ -4256,6 +4448,90 @@
     <p:extLst>
       <p:ext uri="{BB962C8B-B14F-4D97-AF65-F5344CB8AC3E}">
         <p14:creationId xmlns:p14="http://schemas.microsoft.com/office/powerpoint/2010/main" val="190443843"/>
+      </p:ext>
+    </p:extLst>
+  </p:cSld>
+  <p:clrMapOvr>
+    <a:masterClrMapping/>
+  </p:clrMapOvr>
+</p:sld>
+</file>
+
+<file path=ppt/slides/slide7.xml><?xml version="1.0" encoding="utf-8"?>
+<p:sld xmlns:a="http://schemas.openxmlformats.org/drawingml/2006/main" xmlns:r="http://schemas.openxmlformats.org/officeDocument/2006/relationships" xmlns:p="http://schemas.openxmlformats.org/presentationml/2006/main">
+  <p:cSld>
+    <p:spTree>
+      <p:nvGrpSpPr>
+        <p:cNvPr id="1" name=""/>
+        <p:cNvGrpSpPr/>
+        <p:nvPr/>
+      </p:nvGrpSpPr>
+      <p:grpSpPr>
+        <a:xfrm>
+          <a:off x="0" y="0"/>
+          <a:ext cx="0" cy="0"/>
+          <a:chOff x="0" y="0"/>
+          <a:chExt cx="0" cy="0"/>
+        </a:xfrm>
+      </p:grpSpPr>
+      <p:sp>
+        <p:nvSpPr>
+          <p:cNvPr id="3" name="Content Placeholder 2"/>
+          <p:cNvSpPr>
+            <a:spLocks noGrp="1"/>
+          </p:cNvSpPr>
+          <p:nvPr>
+            <p:ph idx="1"/>
+          </p:nvPr>
+        </p:nvSpPr>
+        <p:spPr>
+          <a:xfrm>
+            <a:off x="457200" y="456374"/>
+            <a:ext cx="8229600" cy="5669790"/>
+          </a:xfrm>
+        </p:spPr>
+        <p:txBody>
+          <a:bodyPr/>
+          <a:lstStyle/>
+          <a:p>
+            <a:r>
+              <a:rPr lang="en-US" dirty="0" smtClean="0"/>
+              <a:t>Next up, </a:t>
+            </a:r>
+            <a:r>
+              <a:rPr lang="en-US" dirty="0" err="1" smtClean="0"/>
+              <a:t>grdimage</a:t>
+            </a:r>
+            <a:r>
+              <a:rPr lang="en-US" dirty="0" smtClean="0"/>
+              <a:t>, and </a:t>
+            </a:r>
+            <a:r>
+              <a:rPr lang="en-US" dirty="0" err="1" smtClean="0"/>
+              <a:t>cpt</a:t>
+            </a:r>
+            <a:r>
+              <a:rPr lang="en-US" dirty="0" smtClean="0"/>
+              <a:t> </a:t>
+            </a:r>
+            <a:r>
+              <a:rPr lang="en-US" dirty="0" err="1" smtClean="0"/>
+              <a:t>fileswhich</a:t>
+            </a:r>
+            <a:r>
+              <a:rPr lang="en-US" dirty="0" smtClean="0"/>
+              <a:t> is better seen in the examples…..</a:t>
+            </a:r>
+          </a:p>
+          <a:p>
+            <a:endParaRPr lang="en-US" dirty="0"/>
+          </a:p>
+        </p:txBody>
+      </p:sp>
+    </p:spTree>
+    <p:extLst>
+      <p:ext uri="{BB962C8B-B14F-4D97-AF65-F5344CB8AC3E}">
+        <p14:creationId xmlns:p14="http://schemas.microsoft.com/office/powerpoint/2010/main" val="2406547766"/>
       </p:ext>
     </p:extLst>
   </p:cSld>

</xml_diff>